<commit_message>
update the user stories
</commit_message>
<xml_diff>
--- a/docs/ValuePropositionCanvas.pptx
+++ b/docs/ValuePropositionCanvas.pptx
@@ -4041,8 +4041,8 @@
         </p:nvCxnSpPr>
         <p:spPr>
           <a:xfrm>
-            <a:off x="3307032" y="3432376"/>
-            <a:ext cx="2157741" cy="0"/>
+            <a:off x="3850547" y="3428999"/>
+            <a:ext cx="1614226" cy="3377"/>
           </a:xfrm>
           <a:prstGeom prst="line">
             <a:avLst/>
@@ -4079,8 +4079,8 @@
         </p:nvCxnSpPr>
         <p:spPr>
           <a:xfrm flipH="1" flipV="1">
-            <a:off x="1351896" y="1608934"/>
-            <a:ext cx="1955136" cy="1820065"/>
+            <a:off x="1351896" y="1608935"/>
+            <a:ext cx="1445632" cy="1447875"/>
           </a:xfrm>
           <a:prstGeom prst="line">
             <a:avLst/>
@@ -4117,8 +4117,8 @@
         </p:nvCxnSpPr>
         <p:spPr>
           <a:xfrm flipH="1">
-            <a:off x="1358650" y="3428999"/>
-            <a:ext cx="1948382" cy="1813313"/>
+            <a:off x="1358650" y="3966323"/>
+            <a:ext cx="1438878" cy="1275989"/>
           </a:xfrm>
           <a:prstGeom prst="line">
             <a:avLst/>
@@ -4243,9 +4243,9 @@
           <p:nvPr/>
         </p:nvCxnSpPr>
         <p:spPr>
-          <a:xfrm flipH="1">
+          <a:xfrm flipH="1" flipV="1">
             <a:off x="7308209" y="3428999"/>
-            <a:ext cx="2055444" cy="0"/>
+            <a:ext cx="1545939" cy="12532"/>
           </a:xfrm>
           <a:prstGeom prst="line">
             <a:avLst/>
@@ -4282,8 +4282,8 @@
         </p:nvCxnSpPr>
         <p:spPr>
           <a:xfrm flipV="1">
-            <a:off x="9356897" y="1870745"/>
-            <a:ext cx="1476453" cy="1558255"/>
+            <a:off x="9751738" y="1870746"/>
+            <a:ext cx="1081612" cy="1102291"/>
           </a:xfrm>
           <a:prstGeom prst="line">
             <a:avLst/>
@@ -4320,8 +4320,8 @@
         </p:nvCxnSpPr>
         <p:spPr>
           <a:xfrm>
-            <a:off x="9363651" y="3428999"/>
-            <a:ext cx="1469699" cy="1558255"/>
+            <a:off x="9907398" y="4033428"/>
+            <a:ext cx="925952" cy="953826"/>
           </a:xfrm>
           <a:prstGeom prst="line">
             <a:avLst/>
@@ -4928,7 +4928,7 @@
         </p:nvSpPr>
         <p:spPr>
           <a:xfrm>
-            <a:off x="3078931" y="2046264"/>
+            <a:off x="2768700" y="1846106"/>
             <a:ext cx="2376741" cy="369332"/>
           </a:xfrm>
           <a:prstGeom prst="rect">
@@ -4959,14 +4959,16 @@
             </a:extLst>
           </p:cNvPr>
           <p:cNvCxnSpPr>
+            <a:cxnSpLocks/>
             <a:stCxn id="15" idx="3"/>
+            <a:endCxn id="7" idx="1"/>
           </p:cNvCxnSpPr>
           <p:nvPr/>
         </p:nvCxnSpPr>
         <p:spPr>
           <a:xfrm>
-            <a:off x="5455672" y="2230930"/>
-            <a:ext cx="2080254" cy="664123"/>
+            <a:off x="5145441" y="2030772"/>
+            <a:ext cx="2446982" cy="1026039"/>
           </a:xfrm>
           <a:prstGeom prst="straightConnector1">
             <a:avLst/>
@@ -5004,8 +5006,8 @@
         </p:nvSpPr>
         <p:spPr>
           <a:xfrm>
-            <a:off x="2630268" y="4332050"/>
-            <a:ext cx="2734618" cy="523220"/>
+            <a:off x="2611554" y="2368456"/>
+            <a:ext cx="2734618" cy="492443"/>
           </a:xfrm>
           <a:prstGeom prst="rect">
             <a:avLst/>
@@ -5019,7 +5021,7 @@
           <a:lstStyle/>
           <a:p>
             <a:r>
-              <a:rPr lang="en-US" sz="1400" dirty="0"/>
+              <a:rPr lang="en-US" sz="1300" dirty="0"/>
               <a:t>Cool ‘Thank you for your feedback’ screen</a:t>
             </a:r>
           </a:p>
@@ -5034,13 +5036,17 @@
               </a:ext>
             </a:extLst>
           </p:cNvPr>
-          <p:cNvCxnSpPr/>
+          <p:cNvCxnSpPr>
+            <a:cxnSpLocks/>
+            <a:stCxn id="20" idx="3"/>
+            <a:endCxn id="5" idx="1"/>
+          </p:cNvCxnSpPr>
           <p:nvPr/>
         </p:nvCxnSpPr>
         <p:spPr>
           <a:xfrm flipV="1">
-            <a:off x="5364886" y="2046264"/>
-            <a:ext cx="2613044" cy="2408290"/>
+            <a:off x="5346172" y="2326937"/>
+            <a:ext cx="2745523" cy="287741"/>
           </a:xfrm>
           <a:prstGeom prst="straightConnector1">
             <a:avLst/>
@@ -5157,8 +5163,8 @@
         </p:nvCxnSpPr>
         <p:spPr>
           <a:xfrm>
-            <a:off x="3307032" y="3432376"/>
-            <a:ext cx="2157741" cy="0"/>
+            <a:off x="3875714" y="3432376"/>
+            <a:ext cx="1589059" cy="0"/>
           </a:xfrm>
           <a:prstGeom prst="line">
             <a:avLst/>
@@ -5195,8 +5201,8 @@
         </p:nvCxnSpPr>
         <p:spPr>
           <a:xfrm flipH="1" flipV="1">
-            <a:off x="1351896" y="1608934"/>
-            <a:ext cx="1955136" cy="1820065"/>
+            <a:off x="1351896" y="1608935"/>
+            <a:ext cx="1445632" cy="1447875"/>
           </a:xfrm>
           <a:prstGeom prst="line">
             <a:avLst/>
@@ -5233,8 +5239,8 @@
         </p:nvCxnSpPr>
         <p:spPr>
           <a:xfrm flipH="1">
-            <a:off x="1358650" y="3428999"/>
-            <a:ext cx="1948382" cy="1813313"/>
+            <a:off x="1358650" y="3966323"/>
+            <a:ext cx="1438878" cy="1275989"/>
           </a:xfrm>
           <a:prstGeom prst="line">
             <a:avLst/>
@@ -5255,45 +5261,6 @@
           </a:fontRef>
         </p:style>
       </p:cxnSp>
-      <p:pic>
-        <p:nvPicPr>
-          <p:cNvPr id="13" name="Graphic 12" descr="Present">
-            <a:extLst>
-              <a:ext uri="{FF2B5EF4-FFF2-40B4-BE49-F238E27FC236}">
-                <a16:creationId xmlns:a16="http://schemas.microsoft.com/office/drawing/2014/main" id="{FD0C7DBA-C4AF-4A73-A0B5-EBD06EA4B5D9}"/>
-              </a:ext>
-            </a:extLst>
-          </p:cNvPr>
-          <p:cNvPicPr>
-            <a:picLocks noChangeAspect="1"/>
-          </p:cNvPicPr>
-          <p:nvPr/>
-        </p:nvPicPr>
-        <p:blipFill>
-          <a:blip r:embed="rId2">
-            <a:extLst>
-              <a:ext uri="{28A0092B-C50C-407E-A947-70E740481C1C}">
-                <a14:useLocalDpi xmlns:a14="http://schemas.microsoft.com/office/drawing/2010/main" val="0"/>
-              </a:ext>
-              <a:ext uri="{96DAC541-7B7A-43D3-8B79-37D633B846F1}">
-                <asvg:svgBlip xmlns:asvg="http://schemas.microsoft.com/office/drawing/2016/SVG/main" r:embed="rId3"/>
-              </a:ext>
-            </a:extLst>
-          </a:blip>
-          <a:stretch>
-            <a:fillRect/>
-          </a:stretch>
-        </p:blipFill>
-        <p:spPr>
-          <a:xfrm>
-            <a:off x="2616488" y="2652348"/>
-            <a:ext cx="1381089" cy="1381089"/>
-          </a:xfrm>
-          <a:prstGeom prst="rect">
-            <a:avLst/>
-          </a:prstGeom>
-        </p:spPr>
-      </p:pic>
       <p:sp>
         <p:nvSpPr>
           <p:cNvPr id="21" name="Rectangle: Rounded Corners 20">
@@ -5343,6 +5310,45 @@
           </a:p>
         </p:txBody>
       </p:sp>
+      <p:pic>
+        <p:nvPicPr>
+          <p:cNvPr id="13" name="Graphic 12" descr="Present">
+            <a:extLst>
+              <a:ext uri="{FF2B5EF4-FFF2-40B4-BE49-F238E27FC236}">
+                <a16:creationId xmlns:a16="http://schemas.microsoft.com/office/drawing/2014/main" id="{FD0C7DBA-C4AF-4A73-A0B5-EBD06EA4B5D9}"/>
+              </a:ext>
+            </a:extLst>
+          </p:cNvPr>
+          <p:cNvPicPr>
+            <a:picLocks noChangeAspect="1"/>
+          </p:cNvPicPr>
+          <p:nvPr/>
+        </p:nvPicPr>
+        <p:blipFill>
+          <a:blip r:embed="rId2">
+            <a:extLst>
+              <a:ext uri="{28A0092B-C50C-407E-A947-70E740481C1C}">
+                <a14:useLocalDpi xmlns:a14="http://schemas.microsoft.com/office/drawing/2010/main" val="0"/>
+              </a:ext>
+              <a:ext uri="{96DAC541-7B7A-43D3-8B79-37D633B846F1}">
+                <asvg:svgBlip xmlns:asvg="http://schemas.microsoft.com/office/drawing/2016/SVG/main" r:embed="rId3"/>
+              </a:ext>
+            </a:extLst>
+          </a:blip>
+          <a:stretch>
+            <a:fillRect/>
+          </a:stretch>
+        </p:blipFill>
+        <p:spPr>
+          <a:xfrm>
+            <a:off x="2616488" y="2652348"/>
+            <a:ext cx="1381089" cy="1381089"/>
+          </a:xfrm>
+          <a:prstGeom prst="rect">
+            <a:avLst/>
+          </a:prstGeom>
+        </p:spPr>
+      </p:pic>
       <p:cxnSp>
         <p:nvCxnSpPr>
           <p:cNvPr id="22" name="Straight Connector 21">
@@ -5361,7 +5367,7 @@
         <p:spPr>
           <a:xfrm flipH="1">
             <a:off x="7308209" y="3428999"/>
-            <a:ext cx="2055444" cy="0"/>
+            <a:ext cx="1600899" cy="0"/>
           </a:xfrm>
           <a:prstGeom prst="line">
             <a:avLst/>
@@ -5398,8 +5404,8 @@
         </p:nvCxnSpPr>
         <p:spPr>
           <a:xfrm flipV="1">
-            <a:off x="9356897" y="1870745"/>
-            <a:ext cx="1476453" cy="1558255"/>
+            <a:off x="9751738" y="1870746"/>
+            <a:ext cx="1081612" cy="1116928"/>
           </a:xfrm>
           <a:prstGeom prst="line">
             <a:avLst/>
@@ -5436,8 +5442,8 @@
         </p:nvCxnSpPr>
         <p:spPr>
           <a:xfrm>
-            <a:off x="9363651" y="3428999"/>
-            <a:ext cx="1469699" cy="1558255"/>
+            <a:off x="9865453" y="3896766"/>
+            <a:ext cx="967897" cy="1090488"/>
           </a:xfrm>
           <a:prstGeom prst="line">
             <a:avLst/>
@@ -5729,7 +5735,7 @@
         <p:spPr>
           <a:xfrm>
             <a:off x="9970991" y="2987674"/>
-            <a:ext cx="1476454" cy="1246495"/>
+            <a:ext cx="1476454" cy="900246"/>
           </a:xfrm>
           <a:prstGeom prst="rect">
             <a:avLst/>
@@ -5743,8 +5749,8 @@
           <a:lstStyle/>
           <a:p>
             <a:r>
-              <a:rPr lang="en-US" sz="1500" dirty="0"/>
-              <a:t>Andrea, 28 (F)</a:t>
+              <a:rPr lang="en-US" sz="1050" dirty="0"/>
+              <a:t>Clean-All</a:t>
             </a:r>
           </a:p>
           <a:p>
@@ -5753,8 +5759,8 @@
               <a:buChar char="•"/>
             </a:pPr>
             <a:r>
-              <a:rPr lang="en-US" sz="1500" dirty="0"/>
-              <a:t>French</a:t>
+              <a:rPr lang="en-US" sz="1050" dirty="0"/>
+              <a:t>Swedish company</a:t>
             </a:r>
           </a:p>
           <a:p>
@@ -5763,157 +5769,157 @@
               <a:buChar char="•"/>
             </a:pPr>
             <a:r>
-              <a:rPr lang="en-US" sz="1500" dirty="0"/>
-              <a:t>Living in Italy</a:t>
-            </a:r>
-          </a:p>
+              <a:rPr lang="en-US" sz="1050" dirty="0"/>
+              <a:t>Making Pool cleaning machines</a:t>
+            </a:r>
+          </a:p>
+          <a:p>
+            <a:endParaRPr lang="en-US" sz="1050" dirty="0"/>
+          </a:p>
+        </p:txBody>
+      </p:sp>
+      <p:sp>
+        <p:nvSpPr>
+          <p:cNvPr id="3" name="TextBox 2">
+            <a:extLst>
+              <a:ext uri="{FF2B5EF4-FFF2-40B4-BE49-F238E27FC236}">
+                <a16:creationId xmlns:a16="http://schemas.microsoft.com/office/drawing/2014/main" id="{F2394455-688B-439E-9799-3470BD0ED626}"/>
+              </a:ext>
+            </a:extLst>
+          </p:cNvPr>
+          <p:cNvSpPr txBox="1"/>
+          <p:nvPr/>
+        </p:nvSpPr>
+        <p:spPr>
+          <a:xfrm>
+            <a:off x="8179266" y="3966323"/>
+            <a:ext cx="1904302" cy="1277273"/>
+          </a:xfrm>
+          <a:prstGeom prst="rect">
+            <a:avLst/>
+          </a:prstGeom>
+          <a:noFill/>
+        </p:spPr>
+        <p:txBody>
+          <a:bodyPr wrap="square" rtlCol="0">
+            <a:spAutoFit/>
+          </a:bodyPr>
+          <a:lstStyle/>
+          <a:p>
+            <a:r>
+              <a:rPr lang="en-US" sz="1100" dirty="0"/>
+              <a:t>Wants to expand the market to France, but France government refuse their license because of local voltage regulation. The company would like to complain about this issue.</a:t>
+            </a:r>
+          </a:p>
+        </p:txBody>
+      </p:sp>
+      <p:sp>
+        <p:nvSpPr>
+          <p:cNvPr id="5" name="TextBox 4">
+            <a:extLst>
+              <a:ext uri="{FF2B5EF4-FFF2-40B4-BE49-F238E27FC236}">
+                <a16:creationId xmlns:a16="http://schemas.microsoft.com/office/drawing/2014/main" id="{EE971A4D-A5E2-40DE-93C2-5DEFECF5F158}"/>
+              </a:ext>
+            </a:extLst>
+          </p:cNvPr>
+          <p:cNvSpPr txBox="1"/>
+          <p:nvPr/>
+        </p:nvSpPr>
+        <p:spPr>
+          <a:xfrm>
+            <a:off x="8606242" y="1911438"/>
+            <a:ext cx="1626873" cy="830997"/>
+          </a:xfrm>
+          <a:prstGeom prst="rect">
+            <a:avLst/>
+          </a:prstGeom>
+          <a:noFill/>
+        </p:spPr>
+        <p:txBody>
+          <a:bodyPr wrap="square" rtlCol="0">
+            <a:spAutoFit/>
+          </a:bodyPr>
+          <a:lstStyle/>
+          <a:p>
+            <a:r>
+              <a:rPr lang="en-US" sz="1200" dirty="0"/>
+              <a:t>No one in the company speaks English, they would like to report the issue in Swedish</a:t>
+            </a:r>
+          </a:p>
+        </p:txBody>
+      </p:sp>
+      <p:sp>
+        <p:nvSpPr>
+          <p:cNvPr id="7" name="TextBox 6">
+            <a:extLst>
+              <a:ext uri="{FF2B5EF4-FFF2-40B4-BE49-F238E27FC236}">
+                <a16:creationId xmlns:a16="http://schemas.microsoft.com/office/drawing/2014/main" id="{8D85255E-8750-4F52-AD4D-14786E136B2B}"/>
+              </a:ext>
+            </a:extLst>
+          </p:cNvPr>
+          <p:cNvSpPr txBox="1"/>
+          <p:nvPr/>
+        </p:nvSpPr>
+        <p:spPr>
+          <a:xfrm>
+            <a:off x="7548403" y="2445828"/>
+            <a:ext cx="1261725" cy="938719"/>
+          </a:xfrm>
+          <a:prstGeom prst="rect">
+            <a:avLst/>
+          </a:prstGeom>
+          <a:noFill/>
+        </p:spPr>
+        <p:txBody>
+          <a:bodyPr wrap="square" rtlCol="0">
+            <a:spAutoFit/>
+          </a:bodyPr>
+          <a:lstStyle/>
+          <a:p>
+            <a:r>
+              <a:rPr lang="en-US" sz="1100" dirty="0"/>
+              <a:t>Company is very busy and they would like a fast way to report problems</a:t>
+            </a:r>
+          </a:p>
+        </p:txBody>
+      </p:sp>
+      <p:sp>
+        <p:nvSpPr>
+          <p:cNvPr id="8" name="TextBox 7">
+            <a:extLst>
+              <a:ext uri="{FF2B5EF4-FFF2-40B4-BE49-F238E27FC236}">
+                <a16:creationId xmlns:a16="http://schemas.microsoft.com/office/drawing/2014/main" id="{57791E62-3497-4403-A77A-15F1848C09E3}"/>
+              </a:ext>
+            </a:extLst>
+          </p:cNvPr>
+          <p:cNvSpPr txBox="1"/>
+          <p:nvPr/>
+        </p:nvSpPr>
+        <p:spPr>
+          <a:xfrm>
+            <a:off x="1358649" y="3056810"/>
+            <a:ext cx="1438879" cy="1384995"/>
+          </a:xfrm>
+          <a:prstGeom prst="rect">
+            <a:avLst/>
+          </a:prstGeom>
+          <a:noFill/>
+        </p:spPr>
+        <p:txBody>
+          <a:bodyPr wrap="square" rtlCol="0">
+            <a:spAutoFit/>
+          </a:bodyPr>
+          <a:lstStyle/>
           <a:p>
             <a:pPr marL="285750" indent="-285750">
               <a:buFont typeface="Arial" panose="020B0604020202020204" pitchFamily="34" charset="0"/>
               <a:buChar char="•"/>
             </a:pPr>
             <a:r>
-              <a:rPr lang="en-US" sz="1500" dirty="0"/>
-              <a:t>Like to travel</a:t>
-            </a:r>
-          </a:p>
-          <a:p>
-            <a:endParaRPr lang="en-US" sz="1500" dirty="0"/>
-          </a:p>
-        </p:txBody>
-      </p:sp>
-      <p:sp>
-        <p:nvSpPr>
-          <p:cNvPr id="3" name="TextBox 2">
-            <a:extLst>
-              <a:ext uri="{FF2B5EF4-FFF2-40B4-BE49-F238E27FC236}">
-                <a16:creationId xmlns:a16="http://schemas.microsoft.com/office/drawing/2014/main" id="{F2394455-688B-439E-9799-3470BD0ED626}"/>
-              </a:ext>
-            </a:extLst>
-          </p:cNvPr>
-          <p:cNvSpPr txBox="1"/>
-          <p:nvPr/>
-        </p:nvSpPr>
-        <p:spPr>
-          <a:xfrm>
-            <a:off x="8179266" y="3966323"/>
-            <a:ext cx="1904302" cy="1107996"/>
-          </a:xfrm>
-          <a:prstGeom prst="rect">
-            <a:avLst/>
-          </a:prstGeom>
-          <a:noFill/>
-        </p:spPr>
-        <p:txBody>
-          <a:bodyPr wrap="square" rtlCol="0">
-            <a:spAutoFit/>
-          </a:bodyPr>
-          <a:lstStyle/>
-          <a:p>
-            <a:r>
-              <a:rPr lang="en-US" sz="1100" dirty="0"/>
-              <a:t>She tried to apply for a ticket for her car to save money while driving on the highway. All information were in Italian and the procedure was not explained in detail for her</a:t>
-            </a:r>
-          </a:p>
-        </p:txBody>
-      </p:sp>
-      <p:sp>
-        <p:nvSpPr>
-          <p:cNvPr id="5" name="TextBox 4">
-            <a:extLst>
-              <a:ext uri="{FF2B5EF4-FFF2-40B4-BE49-F238E27FC236}">
-                <a16:creationId xmlns:a16="http://schemas.microsoft.com/office/drawing/2014/main" id="{EE971A4D-A5E2-40DE-93C2-5DEFECF5F158}"/>
-              </a:ext>
-            </a:extLst>
-          </p:cNvPr>
-          <p:cNvSpPr txBox="1"/>
-          <p:nvPr/>
-        </p:nvSpPr>
-        <p:spPr>
-          <a:xfrm>
-            <a:off x="8091695" y="1911438"/>
-            <a:ext cx="1626873" cy="830997"/>
-          </a:xfrm>
-          <a:prstGeom prst="rect">
-            <a:avLst/>
-          </a:prstGeom>
-          <a:noFill/>
-        </p:spPr>
-        <p:txBody>
-          <a:bodyPr wrap="square" rtlCol="0">
-            <a:spAutoFit/>
-          </a:bodyPr>
-          <a:lstStyle/>
-          <a:p>
-            <a:r>
               <a:rPr lang="en-US" sz="1200" dirty="0"/>
-              <a:t>She would like that her problems will be taken seriously in consideration</a:t>
-            </a:r>
-          </a:p>
-        </p:txBody>
-      </p:sp>
-      <p:sp>
-        <p:nvSpPr>
-          <p:cNvPr id="7" name="TextBox 6">
-            <a:extLst>
-              <a:ext uri="{FF2B5EF4-FFF2-40B4-BE49-F238E27FC236}">
-                <a16:creationId xmlns:a16="http://schemas.microsoft.com/office/drawing/2014/main" id="{8D85255E-8750-4F52-AD4D-14786E136B2B}"/>
-              </a:ext>
-            </a:extLst>
-          </p:cNvPr>
-          <p:cNvSpPr txBox="1"/>
-          <p:nvPr/>
-        </p:nvSpPr>
-        <p:spPr>
-          <a:xfrm>
-            <a:off x="7592423" y="2672090"/>
-            <a:ext cx="1261725" cy="769441"/>
-          </a:xfrm>
-          <a:prstGeom prst="rect">
-            <a:avLst/>
-          </a:prstGeom>
-          <a:noFill/>
-        </p:spPr>
-        <p:txBody>
-          <a:bodyPr wrap="square" rtlCol="0">
-            <a:spAutoFit/>
-          </a:bodyPr>
-          <a:lstStyle/>
-          <a:p>
-            <a:r>
-              <a:rPr lang="en-US" sz="1100" dirty="0"/>
-              <a:t>She would like to report travel issue while she is far from home</a:t>
-            </a:r>
-          </a:p>
-        </p:txBody>
-      </p:sp>
-      <p:sp>
-        <p:nvSpPr>
-          <p:cNvPr id="8" name="TextBox 7">
-            <a:extLst>
-              <a:ext uri="{FF2B5EF4-FFF2-40B4-BE49-F238E27FC236}">
-                <a16:creationId xmlns:a16="http://schemas.microsoft.com/office/drawing/2014/main" id="{57791E62-3497-4403-A77A-15F1848C09E3}"/>
-              </a:ext>
-            </a:extLst>
-          </p:cNvPr>
-          <p:cNvSpPr txBox="1"/>
-          <p:nvPr/>
-        </p:nvSpPr>
-        <p:spPr>
-          <a:xfrm>
-            <a:off x="1358649" y="3056810"/>
-            <a:ext cx="1438879" cy="1384995"/>
-          </a:xfrm>
-          <a:prstGeom prst="rect">
-            <a:avLst/>
-          </a:prstGeom>
-          <a:noFill/>
-        </p:spPr>
-        <p:txBody>
-          <a:bodyPr wrap="square" rtlCol="0">
-            <a:spAutoFit/>
-          </a:bodyPr>
-          <a:lstStyle/>
+              <a:t>Fast obstacle research</a:t>
+            </a:r>
+          </a:p>
           <a:p>
             <a:pPr marL="285750" indent="-285750">
               <a:buFont typeface="Arial" panose="020B0604020202020204" pitchFamily="34" charset="0"/>
@@ -5921,17 +5927,7 @@
             </a:pPr>
             <a:r>
               <a:rPr lang="en-US" sz="1200" dirty="0"/>
-              <a:t>Fast obstacle research</a:t>
-            </a:r>
-          </a:p>
-          <a:p>
-            <a:pPr marL="285750" indent="-285750">
-              <a:buFont typeface="Arial" panose="020B0604020202020204" pitchFamily="34" charset="0"/>
-              <a:buChar char="•"/>
-            </a:pPr>
-            <a:r>
-              <a:rPr lang="en-US" sz="1200" dirty="0"/>
-              <a:t>Multiplatform development</a:t>
+              <a:t>Multilanguage app</a:t>
             </a:r>
           </a:p>
           <a:p>
@@ -5967,7 +5963,7 @@
         </p:nvSpPr>
         <p:spPr>
           <a:xfrm>
-            <a:off x="2863102" y="4851664"/>
+            <a:off x="2859238" y="4567383"/>
             <a:ext cx="2192908" cy="369332"/>
           </a:xfrm>
           <a:prstGeom prst="rect">
@@ -5982,7 +5978,7 @@
           <a:lstStyle/>
           <a:p>
             <a:r>
-              <a:rPr lang="en-US" dirty="0"/>
+              <a:rPr lang="en-US" u="sng" dirty="0"/>
               <a:t>Topic-driven research</a:t>
             </a:r>
           </a:p>
@@ -6005,7 +6001,7 @@
         </p:nvCxnSpPr>
         <p:spPr>
           <a:xfrm flipV="1">
-            <a:off x="5056010" y="4385988"/>
+            <a:off x="5052146" y="4101707"/>
             <a:ext cx="3035685" cy="650342"/>
           </a:xfrm>
           <a:prstGeom prst="straightConnector1">
@@ -6044,8 +6040,8 @@
         </p:nvSpPr>
         <p:spPr>
           <a:xfrm>
-            <a:off x="3078931" y="2046264"/>
-            <a:ext cx="2376741" cy="369332"/>
+            <a:off x="2962204" y="1961210"/>
+            <a:ext cx="1314847" cy="307777"/>
           </a:xfrm>
           <a:prstGeom prst="rect">
             <a:avLst/>
@@ -6059,8 +6055,8 @@
           <a:lstStyle/>
           <a:p>
             <a:r>
-              <a:rPr lang="en-US" dirty="0"/>
-              <a:t>Android app from store</a:t>
+              <a:rPr lang="en-US" sz="1400" dirty="0"/>
+              <a:t>Wizard-like app</a:t>
             </a:r>
           </a:p>
         </p:txBody>
@@ -6075,14 +6071,16 @@
             </a:extLst>
           </p:cNvPr>
           <p:cNvCxnSpPr>
+            <a:cxnSpLocks/>
             <a:stCxn id="15" idx="3"/>
+            <a:endCxn id="7" idx="1"/>
           </p:cNvCxnSpPr>
           <p:nvPr/>
         </p:nvCxnSpPr>
         <p:spPr>
           <a:xfrm>
-            <a:off x="5455672" y="2230930"/>
-            <a:ext cx="2080254" cy="664123"/>
+            <a:off x="4277051" y="2115099"/>
+            <a:ext cx="3271352" cy="800089"/>
           </a:xfrm>
           <a:prstGeom prst="straightConnector1">
             <a:avLst/>
@@ -6120,7 +6118,7 @@
         </p:nvSpPr>
         <p:spPr>
           <a:xfrm>
-            <a:off x="2630268" y="4332050"/>
+            <a:off x="2549968" y="2286779"/>
             <a:ext cx="2734618" cy="523220"/>
           </a:xfrm>
           <a:prstGeom prst="rect">
@@ -6136,7 +6134,7 @@
           <a:p>
             <a:r>
               <a:rPr lang="en-US" sz="1400" dirty="0"/>
-              <a:t>Cool ‘Thank you for your feedback’ screen</a:t>
+              <a:t>Language selected from beginning of report</a:t>
             </a:r>
           </a:p>
         </p:txBody>
@@ -6150,13 +6148,17 @@
               </a:ext>
             </a:extLst>
           </p:cNvPr>
-          <p:cNvCxnSpPr/>
+          <p:cNvCxnSpPr>
+            <a:cxnSpLocks/>
+            <a:stCxn id="20" idx="3"/>
+            <a:endCxn id="5" idx="1"/>
+          </p:cNvCxnSpPr>
           <p:nvPr/>
         </p:nvCxnSpPr>
         <p:spPr>
           <a:xfrm flipV="1">
-            <a:off x="5364886" y="2046264"/>
-            <a:ext cx="2613044" cy="2408290"/>
+            <a:off x="5284586" y="2326937"/>
+            <a:ext cx="3321656" cy="221452"/>
           </a:xfrm>
           <a:prstGeom prst="straightConnector1">
             <a:avLst/>

</xml_diff>